<commit_message>
put reloaded model on device
</commit_message>
<xml_diff>
--- a/resources/PDE-CL for Inverse Problems and Design.pptx
+++ b/resources/PDE-CL for Inverse Problems and Design.pptx
@@ -8,13 +8,13 @@
     <p:notesMasterId r:id="rId12"/>
   </p:notesMasterIdLst>
   <p:sldIdLst>
-    <p:sldId id="256" r:id="rId2"/>
-    <p:sldId id="257" r:id="rId3"/>
-    <p:sldId id="268" r:id="rId4"/>
-    <p:sldId id="260" r:id="rId5"/>
-    <p:sldId id="261" r:id="rId6"/>
-    <p:sldId id="269" r:id="rId7"/>
-    <p:sldId id="274" r:id="rId8"/>
+    <p:sldId id="274" r:id="rId2"/>
+    <p:sldId id="256" r:id="rId3"/>
+    <p:sldId id="257" r:id="rId4"/>
+    <p:sldId id="268" r:id="rId5"/>
+    <p:sldId id="260" r:id="rId6"/>
+    <p:sldId id="261" r:id="rId7"/>
+    <p:sldId id="269" r:id="rId8"/>
     <p:sldId id="271" r:id="rId9"/>
     <p:sldId id="273" r:id="rId10"/>
     <p:sldId id="264" r:id="rId11"/>
@@ -5948,7 +5948,7 @@
   <p:cSld>
     <p:spTree>
       <p:nvGrpSpPr>
-        <p:cNvPr id="1" name="Shape 53"/>
+        <p:cNvPr id="1" name=""/>
         <p:cNvGrpSpPr/>
         <p:nvPr/>
       </p:nvGrpSpPr>
@@ -5960,92 +5960,667 @@
           <a:chExt cx="0" cy="0"/>
         </a:xfrm>
       </p:grpSpPr>
+      <mc:AlternateContent xmlns:mc="http://schemas.openxmlformats.org/markup-compatibility/2006">
+        <mc:Choice xmlns:a14="http://schemas.microsoft.com/office/drawing/2010/main" Requires="a14">
+          <p:sp>
+            <p:nvSpPr>
+              <p:cNvPr id="2" name="TextBox 1">
+                <a:extLst>
+                  <a:ext uri="{FF2B5EF4-FFF2-40B4-BE49-F238E27FC236}">
+                    <a16:creationId xmlns:a16="http://schemas.microsoft.com/office/drawing/2014/main" id="{C45F9290-300F-BCA9-D078-0DBE0F52DBCA}"/>
+                  </a:ext>
+                </a:extLst>
+              </p:cNvPr>
+              <p:cNvSpPr txBox="1"/>
+              <p:nvPr/>
+            </p:nvSpPr>
+            <p:spPr>
+              <a:xfrm>
+                <a:off x="588613" y="876228"/>
+                <a:ext cx="3725150" cy="587790"/>
+              </a:xfrm>
+              <a:prstGeom prst="rect">
+                <a:avLst/>
+              </a:prstGeom>
+              <a:noFill/>
+              <a:ln>
+                <a:solidFill>
+                  <a:schemeClr val="tx1"/>
+                </a:solidFill>
+              </a:ln>
+            </p:spPr>
+            <p:txBody>
+              <a:bodyPr wrap="square">
+                <a:spAutoFit/>
+              </a:bodyPr>
+              <a:lstStyle/>
+              <a:p>
+                <a:r>
+                  <a:rPr lang="en-US" sz="1000" dirty="0">
+                    <a:ea typeface="Cambria Math" panose="02040503050406030204" pitchFamily="18" charset="0"/>
+                  </a:rPr>
+                  <a:t>Find </a:t>
+                </a:r>
+                <a14:m>
+                  <m:oMath xmlns:m="http://schemas.openxmlformats.org/officeDocument/2006/math">
+                    <m:acc>
+                      <m:accPr>
+                        <m:chr m:val="⃗"/>
+                        <m:ctrlPr>
+                          <a:rPr lang="en-US" sz="1000" i="1" smtClean="0">
+                            <a:latin typeface="Cambria Math" panose="02040503050406030204" pitchFamily="18" charset="0"/>
+                          </a:rPr>
+                        </m:ctrlPr>
+                      </m:accPr>
+                      <m:e>
+                        <m:r>
+                          <a:rPr lang="en-US" sz="1000" i="1">
+                            <a:latin typeface="Cambria Math" panose="02040503050406030204" pitchFamily="18" charset="0"/>
+                            <a:ea typeface="Cambria Math" panose="02040503050406030204" pitchFamily="18" charset="0"/>
+                          </a:rPr>
+                          <m:t>𝜔</m:t>
+                        </m:r>
+                      </m:e>
+                    </m:acc>
+                    <m:r>
+                      <a:rPr lang="en-US" sz="1000" b="0" i="1" smtClean="0">
+                        <a:latin typeface="Cambria Math" panose="02040503050406030204" pitchFamily="18" charset="0"/>
+                      </a:rPr>
+                      <m:t>=</m:t>
+                    </m:r>
+                    <m:d>
+                      <m:dPr>
+                        <m:begChr m:val="["/>
+                        <m:endChr m:val="]"/>
+                        <m:ctrlPr>
+                          <a:rPr lang="en-US" sz="1000" i="1">
+                            <a:latin typeface="Cambria Math" panose="02040503050406030204" pitchFamily="18" charset="0"/>
+                          </a:rPr>
+                        </m:ctrlPr>
+                      </m:dPr>
+                      <m:e>
+                        <m:m>
+                          <m:mPr>
+                            <m:mcs>
+                              <m:mc>
+                                <m:mcPr>
+                                  <m:count m:val="1"/>
+                                  <m:mcJc m:val="center"/>
+                                </m:mcPr>
+                              </m:mc>
+                            </m:mcs>
+                            <m:ctrlPr>
+                              <a:rPr lang="en-US" sz="1000" i="1">
+                                <a:latin typeface="Cambria Math" panose="02040503050406030204" pitchFamily="18" charset="0"/>
+                              </a:rPr>
+                            </m:ctrlPr>
+                          </m:mPr>
+                          <m:mr>
+                            <m:e>
+                              <m:sSub>
+                                <m:sSubPr>
+                                  <m:ctrlPr>
+                                    <a:rPr lang="en-US" sz="1000" i="1">
+                                      <a:latin typeface="Cambria Math" panose="02040503050406030204" pitchFamily="18" charset="0"/>
+                                    </a:rPr>
+                                  </m:ctrlPr>
+                                </m:sSubPr>
+                                <m:e>
+                                  <m:r>
+                                    <a:rPr lang="en-US" sz="1000" i="1">
+                                      <a:latin typeface="Cambria Math" panose="02040503050406030204" pitchFamily="18" charset="0"/>
+                                      <a:ea typeface="Cambria Math" panose="02040503050406030204" pitchFamily="18" charset="0"/>
+                                    </a:rPr>
+                                    <m:t>𝜔</m:t>
+                                  </m:r>
+                                </m:e>
+                                <m:sub>
+                                  <m:r>
+                                    <a:rPr lang="en-US" sz="1000" i="1">
+                                      <a:latin typeface="Cambria Math" panose="02040503050406030204" pitchFamily="18" charset="0"/>
+                                    </a:rPr>
+                                    <m:t>1</m:t>
+                                  </m:r>
+                                </m:sub>
+                              </m:sSub>
+                            </m:e>
+                          </m:mr>
+                          <m:mr>
+                            <m:e>
+                              <m:r>
+                                <a:rPr lang="en-US" sz="1000" i="1">
+                                  <a:latin typeface="Cambria Math" panose="02040503050406030204" pitchFamily="18" charset="0"/>
+                                </a:rPr>
+                                <m:t>⋮</m:t>
+                              </m:r>
+                            </m:e>
+                          </m:mr>
+                          <m:mr>
+                            <m:e>
+                              <m:sSub>
+                                <m:sSubPr>
+                                  <m:ctrlPr>
+                                    <a:rPr lang="en-US" sz="1000" i="1">
+                                      <a:latin typeface="Cambria Math" panose="02040503050406030204" pitchFamily="18" charset="0"/>
+                                    </a:rPr>
+                                  </m:ctrlPr>
+                                </m:sSubPr>
+                                <m:e>
+                                  <m:r>
+                                    <a:rPr lang="en-US" sz="1000" i="1">
+                                      <a:latin typeface="Cambria Math" panose="02040503050406030204" pitchFamily="18" charset="0"/>
+                                      <a:ea typeface="Cambria Math" panose="02040503050406030204" pitchFamily="18" charset="0"/>
+                                    </a:rPr>
+                                    <m:t>𝜔</m:t>
+                                  </m:r>
+                                </m:e>
+                                <m:sub>
+                                  <m:r>
+                                    <a:rPr lang="en-US" sz="1000" i="1">
+                                      <a:latin typeface="Cambria Math" panose="02040503050406030204" pitchFamily="18" charset="0"/>
+                                      <a:ea typeface="Cambria Math" panose="02040503050406030204" pitchFamily="18" charset="0"/>
+                                    </a:rPr>
+                                    <m:t>𝑁</m:t>
+                                  </m:r>
+                                </m:sub>
+                              </m:sSub>
+                            </m:e>
+                          </m:mr>
+                        </m:m>
+                      </m:e>
+                    </m:d>
+                  </m:oMath>
+                </a14:m>
+                <a:r>
+                  <a:rPr lang="en-US" sz="1000" dirty="0">
+                    <a:ea typeface="Cambria Math" panose="02040503050406030204" pitchFamily="18" charset="0"/>
+                  </a:rPr>
+                  <a:t>, such that </a:t>
+                </a:r>
+                <a14:m>
+                  <m:oMath xmlns:m="http://schemas.openxmlformats.org/officeDocument/2006/math">
+                    <m:r>
+                      <m:rPr>
+                        <m:sty m:val="p"/>
+                      </m:rPr>
+                      <a:rPr lang="el-GR" sz="1000" i="1" smtClean="0">
+                        <a:latin typeface="Cambria Math" panose="02040503050406030204" pitchFamily="18" charset="0"/>
+                        <a:ea typeface="Cambria Math" panose="02040503050406030204" pitchFamily="18" charset="0"/>
+                      </a:rPr>
+                      <m:t>Ϝ</m:t>
+                    </m:r>
+                    <m:d>
+                      <m:dPr>
+                        <m:ctrlPr>
+                          <a:rPr lang="el-GR" sz="1000" i="1" smtClean="0">
+                            <a:latin typeface="Cambria Math" panose="02040503050406030204" pitchFamily="18" charset="0"/>
+                            <a:ea typeface="Cambria Math" panose="02040503050406030204" pitchFamily="18" charset="0"/>
+                          </a:rPr>
+                        </m:ctrlPr>
+                      </m:dPr>
+                      <m:e>
+                        <m:d>
+                          <m:dPr>
+                            <m:begChr m:val="["/>
+                            <m:endChr m:val="]"/>
+                            <m:ctrlPr>
+                              <a:rPr lang="en-US" sz="1000" i="1">
+                                <a:latin typeface="Cambria Math" panose="02040503050406030204" pitchFamily="18" charset="0"/>
+                              </a:rPr>
+                            </m:ctrlPr>
+                          </m:dPr>
+                          <m:e>
+                            <m:m>
+                              <m:mPr>
+                                <m:mcs>
+                                  <m:mc>
+                                    <m:mcPr>
+                                      <m:count m:val="3"/>
+                                      <m:mcJc m:val="center"/>
+                                    </m:mcPr>
+                                  </m:mc>
+                                </m:mcs>
+                                <m:ctrlPr>
+                                  <a:rPr lang="en-US" sz="1000" i="1">
+                                    <a:latin typeface="Cambria Math" panose="02040503050406030204" pitchFamily="18" charset="0"/>
+                                  </a:rPr>
+                                </m:ctrlPr>
+                              </m:mPr>
+                              <m:mr>
+                                <m:e>
+                                  <m:sSub>
+                                    <m:sSubPr>
+                                      <m:ctrlPr>
+                                        <a:rPr lang="en-US" sz="1000" i="1">
+                                          <a:latin typeface="Cambria Math" panose="02040503050406030204" pitchFamily="18" charset="0"/>
+                                        </a:rPr>
+                                      </m:ctrlPr>
+                                    </m:sSubPr>
+                                    <m:e>
+                                      <m:r>
+                                        <a:rPr lang="en-US" sz="1000" i="1">
+                                          <a:latin typeface="Cambria Math" panose="02040503050406030204" pitchFamily="18" charset="0"/>
+                                        </a:rPr>
+                                        <m:t>𝑢</m:t>
+                                      </m:r>
+                                    </m:e>
+                                    <m:sub>
+                                      <m:r>
+                                        <a:rPr lang="en-US" sz="1000" i="1">
+                                          <a:latin typeface="Cambria Math" panose="02040503050406030204" pitchFamily="18" charset="0"/>
+                                        </a:rPr>
+                                        <m:t>11</m:t>
+                                      </m:r>
+                                    </m:sub>
+                                  </m:sSub>
+                                </m:e>
+                                <m:e>
+                                  <m:r>
+                                    <a:rPr lang="en-US" sz="1000" i="1">
+                                      <a:latin typeface="Cambria Math" panose="02040503050406030204" pitchFamily="18" charset="0"/>
+                                    </a:rPr>
+                                    <m:t>⋯</m:t>
+                                  </m:r>
+                                </m:e>
+                                <m:e>
+                                  <m:sSub>
+                                    <m:sSubPr>
+                                      <m:ctrlPr>
+                                        <a:rPr lang="en-US" sz="1000" i="1">
+                                          <a:latin typeface="Cambria Math" panose="02040503050406030204" pitchFamily="18" charset="0"/>
+                                        </a:rPr>
+                                      </m:ctrlPr>
+                                    </m:sSubPr>
+                                    <m:e>
+                                      <m:r>
+                                        <a:rPr lang="en-US" sz="1000" i="1">
+                                          <a:latin typeface="Cambria Math" panose="02040503050406030204" pitchFamily="18" charset="0"/>
+                                        </a:rPr>
+                                        <m:t>𝑢</m:t>
+                                      </m:r>
+                                    </m:e>
+                                    <m:sub>
+                                      <m:r>
+                                        <a:rPr lang="en-US" sz="1000" i="1">
+                                          <a:latin typeface="Cambria Math" panose="02040503050406030204" pitchFamily="18" charset="0"/>
+                                        </a:rPr>
+                                        <m:t>1</m:t>
+                                      </m:r>
+                                      <m:r>
+                                        <a:rPr lang="en-US" sz="1000" i="1">
+                                          <a:latin typeface="Cambria Math" panose="02040503050406030204" pitchFamily="18" charset="0"/>
+                                        </a:rPr>
+                                        <m:t>𝑁</m:t>
+                                      </m:r>
+                                    </m:sub>
+                                  </m:sSub>
+                                </m:e>
+                              </m:mr>
+                              <m:mr>
+                                <m:e>
+                                  <m:r>
+                                    <a:rPr lang="en-US" sz="1000" i="1">
+                                      <a:latin typeface="Cambria Math" panose="02040503050406030204" pitchFamily="18" charset="0"/>
+                                    </a:rPr>
+                                    <m:t>⋮</m:t>
+                                  </m:r>
+                                </m:e>
+                                <m:e>
+                                  <m:r>
+                                    <a:rPr lang="en-US" sz="1000" i="1">
+                                      <a:latin typeface="Cambria Math" panose="02040503050406030204" pitchFamily="18" charset="0"/>
+                                    </a:rPr>
+                                    <m:t>⋱</m:t>
+                                  </m:r>
+                                </m:e>
+                                <m:e>
+                                  <m:r>
+                                    <a:rPr lang="en-US" sz="1000" i="1">
+                                      <a:latin typeface="Cambria Math" panose="02040503050406030204" pitchFamily="18" charset="0"/>
+                                    </a:rPr>
+                                    <m:t>⋮</m:t>
+                                  </m:r>
+                                </m:e>
+                              </m:mr>
+                              <m:mr>
+                                <m:e>
+                                  <m:sSub>
+                                    <m:sSubPr>
+                                      <m:ctrlPr>
+                                        <a:rPr lang="en-US" sz="1000" i="1">
+                                          <a:latin typeface="Cambria Math" panose="02040503050406030204" pitchFamily="18" charset="0"/>
+                                        </a:rPr>
+                                      </m:ctrlPr>
+                                    </m:sSubPr>
+                                    <m:e>
+                                      <m:r>
+                                        <a:rPr lang="en-US" sz="1000" i="1">
+                                          <a:latin typeface="Cambria Math" panose="02040503050406030204" pitchFamily="18" charset="0"/>
+                                        </a:rPr>
+                                        <m:t>𝑢</m:t>
+                                      </m:r>
+                                    </m:e>
+                                    <m:sub>
+                                      <m:r>
+                                        <a:rPr lang="en-US" sz="1000" i="1">
+                                          <a:latin typeface="Cambria Math" panose="02040503050406030204" pitchFamily="18" charset="0"/>
+                                        </a:rPr>
+                                        <m:t>𝑛</m:t>
+                                      </m:r>
+                                      <m:r>
+                                        <a:rPr lang="en-US" sz="1000" i="1">
+                                          <a:latin typeface="Cambria Math" panose="02040503050406030204" pitchFamily="18" charset="0"/>
+                                        </a:rPr>
+                                        <m:t>1</m:t>
+                                      </m:r>
+                                    </m:sub>
+                                  </m:sSub>
+                                </m:e>
+                                <m:e>
+                                  <m:r>
+                                    <a:rPr lang="en-US" sz="1000" i="1">
+                                      <a:latin typeface="Cambria Math" panose="02040503050406030204" pitchFamily="18" charset="0"/>
+                                    </a:rPr>
+                                    <m:t>⋯</m:t>
+                                  </m:r>
+                                </m:e>
+                                <m:e>
+                                  <m:sSub>
+                                    <m:sSubPr>
+                                      <m:ctrlPr>
+                                        <a:rPr lang="en-US" sz="1000" i="1">
+                                          <a:latin typeface="Cambria Math" panose="02040503050406030204" pitchFamily="18" charset="0"/>
+                                        </a:rPr>
+                                      </m:ctrlPr>
+                                    </m:sSubPr>
+                                    <m:e>
+                                      <m:r>
+                                        <a:rPr lang="en-US" sz="1000" i="1">
+                                          <a:latin typeface="Cambria Math" panose="02040503050406030204" pitchFamily="18" charset="0"/>
+                                        </a:rPr>
+                                        <m:t>𝑢</m:t>
+                                      </m:r>
+                                    </m:e>
+                                    <m:sub>
+                                      <m:r>
+                                        <a:rPr lang="en-US" sz="1000" i="1">
+                                          <a:latin typeface="Cambria Math" panose="02040503050406030204" pitchFamily="18" charset="0"/>
+                                        </a:rPr>
+                                        <m:t>𝑛𝑁</m:t>
+                                      </m:r>
+                                    </m:sub>
+                                  </m:sSub>
+                                </m:e>
+                              </m:mr>
+                            </m:m>
+                          </m:e>
+                        </m:d>
+                        <m:d>
+                          <m:dPr>
+                            <m:begChr m:val="["/>
+                            <m:endChr m:val="]"/>
+                            <m:ctrlPr>
+                              <a:rPr lang="en-US" sz="1000" i="1">
+                                <a:latin typeface="Cambria Math" panose="02040503050406030204" pitchFamily="18" charset="0"/>
+                              </a:rPr>
+                            </m:ctrlPr>
+                          </m:dPr>
+                          <m:e>
+                            <m:m>
+                              <m:mPr>
+                                <m:mcs>
+                                  <m:mc>
+                                    <m:mcPr>
+                                      <m:count m:val="1"/>
+                                      <m:mcJc m:val="center"/>
+                                    </m:mcPr>
+                                  </m:mc>
+                                </m:mcs>
+                                <m:ctrlPr>
+                                  <a:rPr lang="en-US" sz="1000" i="1">
+                                    <a:latin typeface="Cambria Math" panose="02040503050406030204" pitchFamily="18" charset="0"/>
+                                  </a:rPr>
+                                </m:ctrlPr>
+                              </m:mPr>
+                              <m:mr>
+                                <m:e>
+                                  <m:sSub>
+                                    <m:sSubPr>
+                                      <m:ctrlPr>
+                                        <a:rPr lang="en-US" sz="1000" i="1">
+                                          <a:latin typeface="Cambria Math" panose="02040503050406030204" pitchFamily="18" charset="0"/>
+                                        </a:rPr>
+                                      </m:ctrlPr>
+                                    </m:sSubPr>
+                                    <m:e>
+                                      <m:r>
+                                        <a:rPr lang="en-US" sz="1000" i="1">
+                                          <a:latin typeface="Cambria Math" panose="02040503050406030204" pitchFamily="18" charset="0"/>
+                                          <a:ea typeface="Cambria Math" panose="02040503050406030204" pitchFamily="18" charset="0"/>
+                                        </a:rPr>
+                                        <m:t>𝜔</m:t>
+                                      </m:r>
+                                    </m:e>
+                                    <m:sub>
+                                      <m:r>
+                                        <a:rPr lang="en-US" sz="1000" i="1">
+                                          <a:latin typeface="Cambria Math" panose="02040503050406030204" pitchFamily="18" charset="0"/>
+                                        </a:rPr>
+                                        <m:t>1</m:t>
+                                      </m:r>
+                                    </m:sub>
+                                  </m:sSub>
+                                </m:e>
+                              </m:mr>
+                              <m:mr>
+                                <m:e>
+                                  <m:r>
+                                    <a:rPr lang="en-US" sz="1000" i="1">
+                                      <a:latin typeface="Cambria Math" panose="02040503050406030204" pitchFamily="18" charset="0"/>
+                                    </a:rPr>
+                                    <m:t>⋮</m:t>
+                                  </m:r>
+                                </m:e>
+                              </m:mr>
+                              <m:mr>
+                                <m:e>
+                                  <m:sSub>
+                                    <m:sSubPr>
+                                      <m:ctrlPr>
+                                        <a:rPr lang="en-US" sz="1000" i="1">
+                                          <a:latin typeface="Cambria Math" panose="02040503050406030204" pitchFamily="18" charset="0"/>
+                                        </a:rPr>
+                                      </m:ctrlPr>
+                                    </m:sSubPr>
+                                    <m:e>
+                                      <m:r>
+                                        <a:rPr lang="en-US" sz="1000" i="1">
+                                          <a:latin typeface="Cambria Math" panose="02040503050406030204" pitchFamily="18" charset="0"/>
+                                          <a:ea typeface="Cambria Math" panose="02040503050406030204" pitchFamily="18" charset="0"/>
+                                        </a:rPr>
+                                        <m:t>𝜔</m:t>
+                                      </m:r>
+                                    </m:e>
+                                    <m:sub>
+                                      <m:r>
+                                        <a:rPr lang="en-US" sz="1000" i="1">
+                                          <a:latin typeface="Cambria Math" panose="02040503050406030204" pitchFamily="18" charset="0"/>
+                                          <a:ea typeface="Cambria Math" panose="02040503050406030204" pitchFamily="18" charset="0"/>
+                                        </a:rPr>
+                                        <m:t>𝑁</m:t>
+                                      </m:r>
+                                    </m:sub>
+                                  </m:sSub>
+                                </m:e>
+                              </m:mr>
+                            </m:m>
+                          </m:e>
+                        </m:d>
+                        <m:r>
+                          <a:rPr lang="en-US" sz="1000" b="0" i="1" smtClean="0">
+                            <a:latin typeface="Cambria Math" panose="02040503050406030204" pitchFamily="18" charset="0"/>
+                            <a:ea typeface="Cambria Math" panose="02040503050406030204" pitchFamily="18" charset="0"/>
+                          </a:rPr>
+                          <m:t>,</m:t>
+                        </m:r>
+                        <m:r>
+                          <a:rPr lang="en-US" sz="1000" i="1">
+                            <a:latin typeface="Cambria Math" panose="02040503050406030204" pitchFamily="18" charset="0"/>
+                            <a:ea typeface="Cambria Math" panose="02040503050406030204" pitchFamily="18" charset="0"/>
+                          </a:rPr>
+                          <m:t>𝛾</m:t>
+                        </m:r>
+                        <m:d>
+                          <m:dPr>
+                            <m:ctrlPr>
+                              <a:rPr lang="en-US" sz="1000" i="1">
+                                <a:latin typeface="Cambria Math" panose="02040503050406030204" pitchFamily="18" charset="0"/>
+                              </a:rPr>
+                            </m:ctrlPr>
+                          </m:dPr>
+                          <m:e>
+                            <m:acc>
+                              <m:accPr>
+                                <m:chr m:val="⃗"/>
+                                <m:ctrlPr>
+                                  <a:rPr lang="en-US" sz="1000" i="1">
+                                    <a:latin typeface="Cambria Math" panose="02040503050406030204" pitchFamily="18" charset="0"/>
+                                  </a:rPr>
+                                </m:ctrlPr>
+                              </m:accPr>
+                              <m:e>
+                                <m:r>
+                                  <a:rPr lang="en-US" sz="1000" i="1">
+                                    <a:latin typeface="Cambria Math" panose="02040503050406030204" pitchFamily="18" charset="0"/>
+                                  </a:rPr>
+                                  <m:t>𝑥</m:t>
+                                </m:r>
+                              </m:e>
+                            </m:acc>
+                            <m:r>
+                              <a:rPr lang="en-US" sz="1000" i="1">
+                                <a:latin typeface="Cambria Math" panose="02040503050406030204" pitchFamily="18" charset="0"/>
+                              </a:rPr>
+                              <m:t>,</m:t>
+                            </m:r>
+                            <m:r>
+                              <a:rPr lang="en-US" sz="1000" i="1">
+                                <a:latin typeface="Cambria Math" panose="02040503050406030204" pitchFamily="18" charset="0"/>
+                              </a:rPr>
+                              <m:t>𝑡</m:t>
+                            </m:r>
+                          </m:e>
+                        </m:d>
+                      </m:e>
+                    </m:d>
+                    <m:r>
+                      <a:rPr lang="en-US" sz="1000" b="0" i="1" smtClean="0">
+                        <a:latin typeface="Cambria Math" panose="02040503050406030204" pitchFamily="18" charset="0"/>
+                        <a:ea typeface="Cambria Math" panose="02040503050406030204" pitchFamily="18" charset="0"/>
+                      </a:rPr>
+                      <m:t>=0</m:t>
+                    </m:r>
+                  </m:oMath>
+                </a14:m>
+                <a:endParaRPr lang="en-US" sz="1000" dirty="0"/>
+              </a:p>
+            </p:txBody>
+          </p:sp>
+        </mc:Choice>
+        <mc:Fallback>
+          <p:sp>
+            <p:nvSpPr>
+              <p:cNvPr id="2" name="TextBox 1">
+                <a:extLst>
+                  <a:ext uri="{FF2B5EF4-FFF2-40B4-BE49-F238E27FC236}">
+                    <a16:creationId xmlns:a16="http://schemas.microsoft.com/office/drawing/2014/main" id="{C45F9290-300F-BCA9-D078-0DBE0F52DBCA}"/>
+                  </a:ext>
+                </a:extLst>
+              </p:cNvPr>
+              <p:cNvSpPr txBox="1">
+                <a:spLocks noRot="1" noChangeAspect="1" noMove="1" noResize="1" noEditPoints="1" noAdjustHandles="1" noChangeArrowheads="1" noChangeShapeType="1" noTextEdit="1"/>
+              </p:cNvSpPr>
+              <p:nvPr/>
+            </p:nvSpPr>
+            <p:spPr>
+              <a:xfrm>
+                <a:off x="588613" y="876228"/>
+                <a:ext cx="3725150" cy="587790"/>
+              </a:xfrm>
+              <a:prstGeom prst="rect">
+                <a:avLst/>
+              </a:prstGeom>
+              <a:blipFill>
+                <a:blip r:embed="rId2"/>
+                <a:stretch>
+                  <a:fillRect/>
+                </a:stretch>
+              </a:blipFill>
+              <a:ln>
+                <a:solidFill>
+                  <a:schemeClr val="tx1"/>
+                </a:solidFill>
+              </a:ln>
+            </p:spPr>
+            <p:txBody>
+              <a:bodyPr/>
+              <a:lstStyle/>
+              <a:p>
+                <a:r>
+                  <a:rPr lang="en-US">
+                    <a:noFill/>
+                  </a:rPr>
+                  <a:t> </a:t>
+                </a:r>
+              </a:p>
+            </p:txBody>
+          </p:sp>
+        </mc:Fallback>
+      </mc:AlternateContent>
       <p:sp>
         <p:nvSpPr>
-          <p:cNvPr id="54" name="Google Shape;54;p13"/>
-          <p:cNvSpPr txBox="1">
-            <a:spLocks noGrp="1"/>
-          </p:cNvSpPr>
-          <p:nvPr>
-            <p:ph type="ctrTitle"/>
-          </p:nvPr>
+          <p:cNvPr id="4" name="TextBox 3">
+            <a:extLst>
+              <a:ext uri="{FF2B5EF4-FFF2-40B4-BE49-F238E27FC236}">
+                <a16:creationId xmlns:a16="http://schemas.microsoft.com/office/drawing/2014/main" id="{91308CA0-C244-D9E6-8632-71E4594ED275}"/>
+              </a:ext>
+            </a:extLst>
+          </p:cNvPr>
+          <p:cNvSpPr txBox="1"/>
+          <p:nvPr/>
         </p:nvSpPr>
         <p:spPr>
           <a:xfrm>
-            <a:off x="311708" y="744575"/>
-            <a:ext cx="8520600" cy="2052600"/>
+            <a:off x="4313763" y="885266"/>
+            <a:ext cx="1743237" cy="584775"/>
           </a:xfrm>
           <a:prstGeom prst="rect">
             <a:avLst/>
           </a:prstGeom>
+          <a:noFill/>
         </p:spPr>
         <p:txBody>
-          <a:bodyPr spcFirstLastPara="1" wrap="square" lIns="91425" tIns="91425" rIns="91425" bIns="91425" anchor="b" anchorCtr="0">
-            <a:noAutofit/>
+          <a:bodyPr wrap="square" rtlCol="0">
+            <a:spAutoFit/>
           </a:bodyPr>
           <a:lstStyle/>
           <a:p>
-            <a:pPr marL="0" lvl="0" indent="0" algn="ctr" rtl="0">
-              <a:spcBef>
-                <a:spcPts val="0"/>
-              </a:spcBef>
-              <a:spcAft>
-                <a:spcPts val="0"/>
-              </a:spcAft>
-              <a:buSzPts val="990"/>
-              <a:buNone/>
-            </a:pPr>
             <a:r>
-              <a:rPr lang="en" sz="3780"/>
-              <a:t>Partial Differential Equation Constrained Layer (PDE-CL) for Inverse Problems and Design </a:t>
+              <a:rPr lang="en-US" sz="3200" dirty="0">
+                <a:latin typeface="Futura Medium" panose="020B0602020204020303" pitchFamily="34" charset="-79"/>
+                <a:cs typeface="Futura Medium" panose="020B0602020204020303" pitchFamily="34" charset="-79"/>
+              </a:rPr>
+              <a:t>PDE-CL</a:t>
             </a:r>
-            <a:endParaRPr sz="3780"/>
-          </a:p>
-        </p:txBody>
-      </p:sp>
-      <p:sp>
-        <p:nvSpPr>
-          <p:cNvPr id="55" name="Google Shape;55;p13"/>
-          <p:cNvSpPr txBox="1">
-            <a:spLocks noGrp="1"/>
-          </p:cNvSpPr>
-          <p:nvPr>
-            <p:ph type="subTitle" idx="1"/>
-          </p:nvPr>
-        </p:nvSpPr>
-        <p:spPr>
-          <a:xfrm>
-            <a:off x="311700" y="2834125"/>
-            <a:ext cx="8520600" cy="792600"/>
-          </a:xfrm>
-          <a:prstGeom prst="rect">
-            <a:avLst/>
-          </a:prstGeom>
-        </p:spPr>
-        <p:txBody>
-          <a:bodyPr spcFirstLastPara="1" wrap="square" lIns="91425" tIns="91425" rIns="91425" bIns="91425" anchor="t" anchorCtr="0">
-            <a:normAutofit/>
-          </a:bodyPr>
-          <a:lstStyle/>
-          <a:p>
-            <a:pPr marL="0" lvl="0" indent="0" algn="ctr" rtl="0">
-              <a:spcBef>
-                <a:spcPts val="0"/>
-              </a:spcBef>
-              <a:spcAft>
-                <a:spcPts val="0"/>
-              </a:spcAft>
-              <a:buNone/>
-            </a:pPr>
-            <a:r>
-              <a:rPr lang="en"/>
-              <a:t>March 20, 2023</a:t>
-            </a:r>
-            <a:endParaRPr/>
           </a:p>
         </p:txBody>
       </p:sp>
     </p:spTree>
+    <p:extLst>
+      <p:ext uri="{BB962C8B-B14F-4D97-AF65-F5344CB8AC3E}">
+        <p14:creationId xmlns:p14="http://schemas.microsoft.com/office/powerpoint/2010/main" val="2150363726"/>
+      </p:ext>
+    </p:extLst>
   </p:cSld>
   <p:clrMapOvr>
     <a:masterClrMapping/>
@@ -9986,6 +10561,116 @@
   <p:cSld>
     <p:spTree>
       <p:nvGrpSpPr>
+        <p:cNvPr id="1" name="Shape 53"/>
+        <p:cNvGrpSpPr/>
+        <p:nvPr/>
+      </p:nvGrpSpPr>
+      <p:grpSpPr>
+        <a:xfrm>
+          <a:off x="0" y="0"/>
+          <a:ext cx="0" cy="0"/>
+          <a:chOff x="0" y="0"/>
+          <a:chExt cx="0" cy="0"/>
+        </a:xfrm>
+      </p:grpSpPr>
+      <p:sp>
+        <p:nvSpPr>
+          <p:cNvPr id="54" name="Google Shape;54;p13"/>
+          <p:cNvSpPr txBox="1">
+            <a:spLocks noGrp="1"/>
+          </p:cNvSpPr>
+          <p:nvPr>
+            <p:ph type="ctrTitle"/>
+          </p:nvPr>
+        </p:nvSpPr>
+        <p:spPr>
+          <a:xfrm>
+            <a:off x="311708" y="744575"/>
+            <a:ext cx="8520600" cy="2052600"/>
+          </a:xfrm>
+          <a:prstGeom prst="rect">
+            <a:avLst/>
+          </a:prstGeom>
+        </p:spPr>
+        <p:txBody>
+          <a:bodyPr spcFirstLastPara="1" wrap="square" lIns="91425" tIns="91425" rIns="91425" bIns="91425" anchor="b" anchorCtr="0">
+            <a:noAutofit/>
+          </a:bodyPr>
+          <a:lstStyle/>
+          <a:p>
+            <a:pPr marL="0" lvl="0" indent="0" algn="ctr" rtl="0">
+              <a:spcBef>
+                <a:spcPts val="0"/>
+              </a:spcBef>
+              <a:spcAft>
+                <a:spcPts val="0"/>
+              </a:spcAft>
+              <a:buSzPts val="990"/>
+              <a:buNone/>
+            </a:pPr>
+            <a:r>
+              <a:rPr lang="en" sz="3780"/>
+              <a:t>Partial Differential Equation Constrained Layer (PDE-CL) for Inverse Problems and Design </a:t>
+            </a:r>
+            <a:endParaRPr sz="3780"/>
+          </a:p>
+        </p:txBody>
+      </p:sp>
+      <p:sp>
+        <p:nvSpPr>
+          <p:cNvPr id="55" name="Google Shape;55;p13"/>
+          <p:cNvSpPr txBox="1">
+            <a:spLocks noGrp="1"/>
+          </p:cNvSpPr>
+          <p:nvPr>
+            <p:ph type="subTitle" idx="1"/>
+          </p:nvPr>
+        </p:nvSpPr>
+        <p:spPr>
+          <a:xfrm>
+            <a:off x="311700" y="2834125"/>
+            <a:ext cx="8520600" cy="792600"/>
+          </a:xfrm>
+          <a:prstGeom prst="rect">
+            <a:avLst/>
+          </a:prstGeom>
+        </p:spPr>
+        <p:txBody>
+          <a:bodyPr spcFirstLastPara="1" wrap="square" lIns="91425" tIns="91425" rIns="91425" bIns="91425" anchor="t" anchorCtr="0">
+            <a:normAutofit/>
+          </a:bodyPr>
+          <a:lstStyle/>
+          <a:p>
+            <a:pPr marL="0" lvl="0" indent="0" algn="ctr" rtl="0">
+              <a:spcBef>
+                <a:spcPts val="0"/>
+              </a:spcBef>
+              <a:spcAft>
+                <a:spcPts val="0"/>
+              </a:spcAft>
+              <a:buNone/>
+            </a:pPr>
+            <a:r>
+              <a:rPr lang="en"/>
+              <a:t>March 20, 2023</a:t>
+            </a:r>
+            <a:endParaRPr/>
+          </a:p>
+        </p:txBody>
+      </p:sp>
+    </p:spTree>
+  </p:cSld>
+  <p:clrMapOvr>
+    <a:masterClrMapping/>
+  </p:clrMapOvr>
+</p:sld>
+</file>
+
+<file path=ppt/slides/slide3.xml><?xml version="1.0" encoding="utf-8"?>
+<p:sld xmlns:a="http://schemas.openxmlformats.org/drawingml/2006/main" xmlns:r="http://schemas.openxmlformats.org/officeDocument/2006/relationships" xmlns:p="http://schemas.openxmlformats.org/presentationml/2006/main">
+  <p:cSld>
+    <p:spTree>
+      <p:nvGrpSpPr>
         <p:cNvPr id="1" name="Shape 59"/>
         <p:cNvGrpSpPr/>
         <p:nvPr/>
@@ -11069,7 +11754,7 @@
 </p:sld>
 </file>
 
-<file path=ppt/slides/slide3.xml><?xml version="1.0" encoding="utf-8"?>
+<file path=ppt/slides/slide4.xml><?xml version="1.0" encoding="utf-8"?>
 <p:sld xmlns:a="http://schemas.openxmlformats.org/drawingml/2006/main" xmlns:r="http://schemas.openxmlformats.org/officeDocument/2006/relationships" xmlns:p="http://schemas.openxmlformats.org/presentationml/2006/main">
   <p:cSld>
     <p:spTree>
@@ -14629,7 +15314,7 @@
 </p:sld>
 </file>
 
-<file path=ppt/slides/slide4.xml><?xml version="1.0" encoding="utf-8"?>
+<file path=ppt/slides/slide5.xml><?xml version="1.0" encoding="utf-8"?>
 <p:sld xmlns:a="http://schemas.openxmlformats.org/drawingml/2006/main" xmlns:r="http://schemas.openxmlformats.org/officeDocument/2006/relationships" xmlns:p="http://schemas.openxmlformats.org/presentationml/2006/main">
   <p:cSld>
     <p:spTree>
@@ -16471,7 +17156,7 @@
 </p:sld>
 </file>
 
-<file path=ppt/slides/slide5.xml><?xml version="1.0" encoding="utf-8"?>
+<file path=ppt/slides/slide6.xml><?xml version="1.0" encoding="utf-8"?>
 <p:sld xmlns:a="http://schemas.openxmlformats.org/drawingml/2006/main" xmlns:r="http://schemas.openxmlformats.org/officeDocument/2006/relationships" xmlns:p="http://schemas.openxmlformats.org/presentationml/2006/main">
   <p:cSld>
     <p:spTree>
@@ -18826,7 +19511,7 @@
 </p:sld>
 </file>
 
-<file path=ppt/slides/slide6.xml><?xml version="1.0" encoding="utf-8"?>
+<file path=ppt/slides/slide7.xml><?xml version="1.0" encoding="utf-8"?>
 <p:sld xmlns:a="http://schemas.openxmlformats.org/drawingml/2006/main" xmlns:r="http://schemas.openxmlformats.org/officeDocument/2006/relationships" xmlns:p="http://schemas.openxmlformats.org/presentationml/2006/main">
   <p:cSld>
     <p:spTree>
@@ -22014,691 +22699,6 @@
     <p:extLst>
       <p:ext uri="{BB962C8B-B14F-4D97-AF65-F5344CB8AC3E}">
         <p14:creationId xmlns:p14="http://schemas.microsoft.com/office/powerpoint/2010/main" val="1609187969"/>
-      </p:ext>
-    </p:extLst>
-  </p:cSld>
-  <p:clrMapOvr>
-    <a:masterClrMapping/>
-  </p:clrMapOvr>
-</p:sld>
-</file>
-
-<file path=ppt/slides/slide7.xml><?xml version="1.0" encoding="utf-8"?>
-<p:sld xmlns:a="http://schemas.openxmlformats.org/drawingml/2006/main" xmlns:r="http://schemas.openxmlformats.org/officeDocument/2006/relationships" xmlns:p="http://schemas.openxmlformats.org/presentationml/2006/main">
-  <p:cSld>
-    <p:spTree>
-      <p:nvGrpSpPr>
-        <p:cNvPr id="1" name=""/>
-        <p:cNvGrpSpPr/>
-        <p:nvPr/>
-      </p:nvGrpSpPr>
-      <p:grpSpPr>
-        <a:xfrm>
-          <a:off x="0" y="0"/>
-          <a:ext cx="0" cy="0"/>
-          <a:chOff x="0" y="0"/>
-          <a:chExt cx="0" cy="0"/>
-        </a:xfrm>
-      </p:grpSpPr>
-      <mc:AlternateContent xmlns:mc="http://schemas.openxmlformats.org/markup-compatibility/2006">
-        <mc:Choice xmlns:a14="http://schemas.microsoft.com/office/drawing/2010/main" Requires="a14">
-          <p:sp>
-            <p:nvSpPr>
-              <p:cNvPr id="2" name="TextBox 1">
-                <a:extLst>
-                  <a:ext uri="{FF2B5EF4-FFF2-40B4-BE49-F238E27FC236}">
-                    <a16:creationId xmlns:a16="http://schemas.microsoft.com/office/drawing/2014/main" id="{C45F9290-300F-BCA9-D078-0DBE0F52DBCA}"/>
-                  </a:ext>
-                </a:extLst>
-              </p:cNvPr>
-              <p:cNvSpPr txBox="1"/>
-              <p:nvPr/>
-            </p:nvSpPr>
-            <p:spPr>
-              <a:xfrm>
-                <a:off x="588613" y="876228"/>
-                <a:ext cx="3725150" cy="587790"/>
-              </a:xfrm>
-              <a:prstGeom prst="rect">
-                <a:avLst/>
-              </a:prstGeom>
-              <a:noFill/>
-              <a:ln>
-                <a:solidFill>
-                  <a:schemeClr val="tx1"/>
-                </a:solidFill>
-              </a:ln>
-            </p:spPr>
-            <p:txBody>
-              <a:bodyPr wrap="square">
-                <a:spAutoFit/>
-              </a:bodyPr>
-              <a:lstStyle/>
-              <a:p>
-                <a:r>
-                  <a:rPr lang="en-US" sz="1000" dirty="0">
-                    <a:ea typeface="Cambria Math" panose="02040503050406030204" pitchFamily="18" charset="0"/>
-                  </a:rPr>
-                  <a:t>Find </a:t>
-                </a:r>
-                <a14:m>
-                  <m:oMath xmlns:m="http://schemas.openxmlformats.org/officeDocument/2006/math">
-                    <m:acc>
-                      <m:accPr>
-                        <m:chr m:val="⃗"/>
-                        <m:ctrlPr>
-                          <a:rPr lang="en-US" sz="1000" i="1" smtClean="0">
-                            <a:latin typeface="Cambria Math" panose="02040503050406030204" pitchFamily="18" charset="0"/>
-                          </a:rPr>
-                        </m:ctrlPr>
-                      </m:accPr>
-                      <m:e>
-                        <m:r>
-                          <a:rPr lang="en-US" sz="1000" i="1">
-                            <a:latin typeface="Cambria Math" panose="02040503050406030204" pitchFamily="18" charset="0"/>
-                            <a:ea typeface="Cambria Math" panose="02040503050406030204" pitchFamily="18" charset="0"/>
-                          </a:rPr>
-                          <m:t>𝜔</m:t>
-                        </m:r>
-                      </m:e>
-                    </m:acc>
-                    <m:r>
-                      <a:rPr lang="en-US" sz="1000" b="0" i="1" smtClean="0">
-                        <a:latin typeface="Cambria Math" panose="02040503050406030204" pitchFamily="18" charset="0"/>
-                      </a:rPr>
-                      <m:t>=</m:t>
-                    </m:r>
-                    <m:d>
-                      <m:dPr>
-                        <m:begChr m:val="["/>
-                        <m:endChr m:val="]"/>
-                        <m:ctrlPr>
-                          <a:rPr lang="en-US" sz="1000" i="1">
-                            <a:latin typeface="Cambria Math" panose="02040503050406030204" pitchFamily="18" charset="0"/>
-                          </a:rPr>
-                        </m:ctrlPr>
-                      </m:dPr>
-                      <m:e>
-                        <m:m>
-                          <m:mPr>
-                            <m:mcs>
-                              <m:mc>
-                                <m:mcPr>
-                                  <m:count m:val="1"/>
-                                  <m:mcJc m:val="center"/>
-                                </m:mcPr>
-                              </m:mc>
-                            </m:mcs>
-                            <m:ctrlPr>
-                              <a:rPr lang="en-US" sz="1000" i="1">
-                                <a:latin typeface="Cambria Math" panose="02040503050406030204" pitchFamily="18" charset="0"/>
-                              </a:rPr>
-                            </m:ctrlPr>
-                          </m:mPr>
-                          <m:mr>
-                            <m:e>
-                              <m:sSub>
-                                <m:sSubPr>
-                                  <m:ctrlPr>
-                                    <a:rPr lang="en-US" sz="1000" i="1">
-                                      <a:latin typeface="Cambria Math" panose="02040503050406030204" pitchFamily="18" charset="0"/>
-                                    </a:rPr>
-                                  </m:ctrlPr>
-                                </m:sSubPr>
-                                <m:e>
-                                  <m:r>
-                                    <a:rPr lang="en-US" sz="1000" i="1">
-                                      <a:latin typeface="Cambria Math" panose="02040503050406030204" pitchFamily="18" charset="0"/>
-                                      <a:ea typeface="Cambria Math" panose="02040503050406030204" pitchFamily="18" charset="0"/>
-                                    </a:rPr>
-                                    <m:t>𝜔</m:t>
-                                  </m:r>
-                                </m:e>
-                                <m:sub>
-                                  <m:r>
-                                    <a:rPr lang="en-US" sz="1000" i="1">
-                                      <a:latin typeface="Cambria Math" panose="02040503050406030204" pitchFamily="18" charset="0"/>
-                                    </a:rPr>
-                                    <m:t>1</m:t>
-                                  </m:r>
-                                </m:sub>
-                              </m:sSub>
-                            </m:e>
-                          </m:mr>
-                          <m:mr>
-                            <m:e>
-                              <m:r>
-                                <a:rPr lang="en-US" sz="1000" i="1">
-                                  <a:latin typeface="Cambria Math" panose="02040503050406030204" pitchFamily="18" charset="0"/>
-                                </a:rPr>
-                                <m:t>⋮</m:t>
-                              </m:r>
-                            </m:e>
-                          </m:mr>
-                          <m:mr>
-                            <m:e>
-                              <m:sSub>
-                                <m:sSubPr>
-                                  <m:ctrlPr>
-                                    <a:rPr lang="en-US" sz="1000" i="1">
-                                      <a:latin typeface="Cambria Math" panose="02040503050406030204" pitchFamily="18" charset="0"/>
-                                    </a:rPr>
-                                  </m:ctrlPr>
-                                </m:sSubPr>
-                                <m:e>
-                                  <m:r>
-                                    <a:rPr lang="en-US" sz="1000" i="1">
-                                      <a:latin typeface="Cambria Math" panose="02040503050406030204" pitchFamily="18" charset="0"/>
-                                      <a:ea typeface="Cambria Math" panose="02040503050406030204" pitchFamily="18" charset="0"/>
-                                    </a:rPr>
-                                    <m:t>𝜔</m:t>
-                                  </m:r>
-                                </m:e>
-                                <m:sub>
-                                  <m:r>
-                                    <a:rPr lang="en-US" sz="1000" i="1">
-                                      <a:latin typeface="Cambria Math" panose="02040503050406030204" pitchFamily="18" charset="0"/>
-                                      <a:ea typeface="Cambria Math" panose="02040503050406030204" pitchFamily="18" charset="0"/>
-                                    </a:rPr>
-                                    <m:t>𝑁</m:t>
-                                  </m:r>
-                                </m:sub>
-                              </m:sSub>
-                            </m:e>
-                          </m:mr>
-                        </m:m>
-                      </m:e>
-                    </m:d>
-                  </m:oMath>
-                </a14:m>
-                <a:r>
-                  <a:rPr lang="en-US" sz="1000" dirty="0">
-                    <a:ea typeface="Cambria Math" panose="02040503050406030204" pitchFamily="18" charset="0"/>
-                  </a:rPr>
-                  <a:t>, such that </a:t>
-                </a:r>
-                <a14:m>
-                  <m:oMath xmlns:m="http://schemas.openxmlformats.org/officeDocument/2006/math">
-                    <m:r>
-                      <m:rPr>
-                        <m:sty m:val="p"/>
-                      </m:rPr>
-                      <a:rPr lang="el-GR" sz="1000" i="1" smtClean="0">
-                        <a:latin typeface="Cambria Math" panose="02040503050406030204" pitchFamily="18" charset="0"/>
-                        <a:ea typeface="Cambria Math" panose="02040503050406030204" pitchFamily="18" charset="0"/>
-                      </a:rPr>
-                      <m:t>Ϝ</m:t>
-                    </m:r>
-                    <m:d>
-                      <m:dPr>
-                        <m:ctrlPr>
-                          <a:rPr lang="el-GR" sz="1000" i="1" smtClean="0">
-                            <a:latin typeface="Cambria Math" panose="02040503050406030204" pitchFamily="18" charset="0"/>
-                            <a:ea typeface="Cambria Math" panose="02040503050406030204" pitchFamily="18" charset="0"/>
-                          </a:rPr>
-                        </m:ctrlPr>
-                      </m:dPr>
-                      <m:e>
-                        <m:d>
-                          <m:dPr>
-                            <m:begChr m:val="["/>
-                            <m:endChr m:val="]"/>
-                            <m:ctrlPr>
-                              <a:rPr lang="en-US" sz="1000" i="1">
-                                <a:latin typeface="Cambria Math" panose="02040503050406030204" pitchFamily="18" charset="0"/>
-                              </a:rPr>
-                            </m:ctrlPr>
-                          </m:dPr>
-                          <m:e>
-                            <m:m>
-                              <m:mPr>
-                                <m:mcs>
-                                  <m:mc>
-                                    <m:mcPr>
-                                      <m:count m:val="3"/>
-                                      <m:mcJc m:val="center"/>
-                                    </m:mcPr>
-                                  </m:mc>
-                                </m:mcs>
-                                <m:ctrlPr>
-                                  <a:rPr lang="en-US" sz="1000" i="1">
-                                    <a:latin typeface="Cambria Math" panose="02040503050406030204" pitchFamily="18" charset="0"/>
-                                  </a:rPr>
-                                </m:ctrlPr>
-                              </m:mPr>
-                              <m:mr>
-                                <m:e>
-                                  <m:sSub>
-                                    <m:sSubPr>
-                                      <m:ctrlPr>
-                                        <a:rPr lang="en-US" sz="1000" i="1">
-                                          <a:latin typeface="Cambria Math" panose="02040503050406030204" pitchFamily="18" charset="0"/>
-                                        </a:rPr>
-                                      </m:ctrlPr>
-                                    </m:sSubPr>
-                                    <m:e>
-                                      <m:r>
-                                        <a:rPr lang="en-US" sz="1000" i="1">
-                                          <a:latin typeface="Cambria Math" panose="02040503050406030204" pitchFamily="18" charset="0"/>
-                                        </a:rPr>
-                                        <m:t>𝑢</m:t>
-                                      </m:r>
-                                    </m:e>
-                                    <m:sub>
-                                      <m:r>
-                                        <a:rPr lang="en-US" sz="1000" i="1">
-                                          <a:latin typeface="Cambria Math" panose="02040503050406030204" pitchFamily="18" charset="0"/>
-                                        </a:rPr>
-                                        <m:t>11</m:t>
-                                      </m:r>
-                                    </m:sub>
-                                  </m:sSub>
-                                </m:e>
-                                <m:e>
-                                  <m:r>
-                                    <a:rPr lang="en-US" sz="1000" i="1">
-                                      <a:latin typeface="Cambria Math" panose="02040503050406030204" pitchFamily="18" charset="0"/>
-                                    </a:rPr>
-                                    <m:t>⋯</m:t>
-                                  </m:r>
-                                </m:e>
-                                <m:e>
-                                  <m:sSub>
-                                    <m:sSubPr>
-                                      <m:ctrlPr>
-                                        <a:rPr lang="en-US" sz="1000" i="1">
-                                          <a:latin typeface="Cambria Math" panose="02040503050406030204" pitchFamily="18" charset="0"/>
-                                        </a:rPr>
-                                      </m:ctrlPr>
-                                    </m:sSubPr>
-                                    <m:e>
-                                      <m:r>
-                                        <a:rPr lang="en-US" sz="1000" i="1">
-                                          <a:latin typeface="Cambria Math" panose="02040503050406030204" pitchFamily="18" charset="0"/>
-                                        </a:rPr>
-                                        <m:t>𝑢</m:t>
-                                      </m:r>
-                                    </m:e>
-                                    <m:sub>
-                                      <m:r>
-                                        <a:rPr lang="en-US" sz="1000" i="1">
-                                          <a:latin typeface="Cambria Math" panose="02040503050406030204" pitchFamily="18" charset="0"/>
-                                        </a:rPr>
-                                        <m:t>1</m:t>
-                                      </m:r>
-                                      <m:r>
-                                        <a:rPr lang="en-US" sz="1000" i="1">
-                                          <a:latin typeface="Cambria Math" panose="02040503050406030204" pitchFamily="18" charset="0"/>
-                                        </a:rPr>
-                                        <m:t>𝑁</m:t>
-                                      </m:r>
-                                    </m:sub>
-                                  </m:sSub>
-                                </m:e>
-                              </m:mr>
-                              <m:mr>
-                                <m:e>
-                                  <m:r>
-                                    <a:rPr lang="en-US" sz="1000" i="1">
-                                      <a:latin typeface="Cambria Math" panose="02040503050406030204" pitchFamily="18" charset="0"/>
-                                    </a:rPr>
-                                    <m:t>⋮</m:t>
-                                  </m:r>
-                                </m:e>
-                                <m:e>
-                                  <m:r>
-                                    <a:rPr lang="en-US" sz="1000" i="1">
-                                      <a:latin typeface="Cambria Math" panose="02040503050406030204" pitchFamily="18" charset="0"/>
-                                    </a:rPr>
-                                    <m:t>⋱</m:t>
-                                  </m:r>
-                                </m:e>
-                                <m:e>
-                                  <m:r>
-                                    <a:rPr lang="en-US" sz="1000" i="1">
-                                      <a:latin typeface="Cambria Math" panose="02040503050406030204" pitchFamily="18" charset="0"/>
-                                    </a:rPr>
-                                    <m:t>⋮</m:t>
-                                  </m:r>
-                                </m:e>
-                              </m:mr>
-                              <m:mr>
-                                <m:e>
-                                  <m:sSub>
-                                    <m:sSubPr>
-                                      <m:ctrlPr>
-                                        <a:rPr lang="en-US" sz="1000" i="1">
-                                          <a:latin typeface="Cambria Math" panose="02040503050406030204" pitchFamily="18" charset="0"/>
-                                        </a:rPr>
-                                      </m:ctrlPr>
-                                    </m:sSubPr>
-                                    <m:e>
-                                      <m:r>
-                                        <a:rPr lang="en-US" sz="1000" i="1">
-                                          <a:latin typeface="Cambria Math" panose="02040503050406030204" pitchFamily="18" charset="0"/>
-                                        </a:rPr>
-                                        <m:t>𝑢</m:t>
-                                      </m:r>
-                                    </m:e>
-                                    <m:sub>
-                                      <m:r>
-                                        <a:rPr lang="en-US" sz="1000" i="1">
-                                          <a:latin typeface="Cambria Math" panose="02040503050406030204" pitchFamily="18" charset="0"/>
-                                        </a:rPr>
-                                        <m:t>𝑛</m:t>
-                                      </m:r>
-                                      <m:r>
-                                        <a:rPr lang="en-US" sz="1000" i="1">
-                                          <a:latin typeface="Cambria Math" panose="02040503050406030204" pitchFamily="18" charset="0"/>
-                                        </a:rPr>
-                                        <m:t>1</m:t>
-                                      </m:r>
-                                    </m:sub>
-                                  </m:sSub>
-                                </m:e>
-                                <m:e>
-                                  <m:r>
-                                    <a:rPr lang="en-US" sz="1000" i="1">
-                                      <a:latin typeface="Cambria Math" panose="02040503050406030204" pitchFamily="18" charset="0"/>
-                                    </a:rPr>
-                                    <m:t>⋯</m:t>
-                                  </m:r>
-                                </m:e>
-                                <m:e>
-                                  <m:sSub>
-                                    <m:sSubPr>
-                                      <m:ctrlPr>
-                                        <a:rPr lang="en-US" sz="1000" i="1">
-                                          <a:latin typeface="Cambria Math" panose="02040503050406030204" pitchFamily="18" charset="0"/>
-                                        </a:rPr>
-                                      </m:ctrlPr>
-                                    </m:sSubPr>
-                                    <m:e>
-                                      <m:r>
-                                        <a:rPr lang="en-US" sz="1000" i="1">
-                                          <a:latin typeface="Cambria Math" panose="02040503050406030204" pitchFamily="18" charset="0"/>
-                                        </a:rPr>
-                                        <m:t>𝑢</m:t>
-                                      </m:r>
-                                    </m:e>
-                                    <m:sub>
-                                      <m:r>
-                                        <a:rPr lang="en-US" sz="1000" i="1">
-                                          <a:latin typeface="Cambria Math" panose="02040503050406030204" pitchFamily="18" charset="0"/>
-                                        </a:rPr>
-                                        <m:t>𝑛𝑁</m:t>
-                                      </m:r>
-                                    </m:sub>
-                                  </m:sSub>
-                                </m:e>
-                              </m:mr>
-                            </m:m>
-                          </m:e>
-                        </m:d>
-                        <m:d>
-                          <m:dPr>
-                            <m:begChr m:val="["/>
-                            <m:endChr m:val="]"/>
-                            <m:ctrlPr>
-                              <a:rPr lang="en-US" sz="1000" i="1">
-                                <a:latin typeface="Cambria Math" panose="02040503050406030204" pitchFamily="18" charset="0"/>
-                              </a:rPr>
-                            </m:ctrlPr>
-                          </m:dPr>
-                          <m:e>
-                            <m:m>
-                              <m:mPr>
-                                <m:mcs>
-                                  <m:mc>
-                                    <m:mcPr>
-                                      <m:count m:val="1"/>
-                                      <m:mcJc m:val="center"/>
-                                    </m:mcPr>
-                                  </m:mc>
-                                </m:mcs>
-                                <m:ctrlPr>
-                                  <a:rPr lang="en-US" sz="1000" i="1">
-                                    <a:latin typeface="Cambria Math" panose="02040503050406030204" pitchFamily="18" charset="0"/>
-                                  </a:rPr>
-                                </m:ctrlPr>
-                              </m:mPr>
-                              <m:mr>
-                                <m:e>
-                                  <m:sSub>
-                                    <m:sSubPr>
-                                      <m:ctrlPr>
-                                        <a:rPr lang="en-US" sz="1000" i="1">
-                                          <a:latin typeface="Cambria Math" panose="02040503050406030204" pitchFamily="18" charset="0"/>
-                                        </a:rPr>
-                                      </m:ctrlPr>
-                                    </m:sSubPr>
-                                    <m:e>
-                                      <m:r>
-                                        <a:rPr lang="en-US" sz="1000" i="1">
-                                          <a:latin typeface="Cambria Math" panose="02040503050406030204" pitchFamily="18" charset="0"/>
-                                          <a:ea typeface="Cambria Math" panose="02040503050406030204" pitchFamily="18" charset="0"/>
-                                        </a:rPr>
-                                        <m:t>𝜔</m:t>
-                                      </m:r>
-                                    </m:e>
-                                    <m:sub>
-                                      <m:r>
-                                        <a:rPr lang="en-US" sz="1000" i="1">
-                                          <a:latin typeface="Cambria Math" panose="02040503050406030204" pitchFamily="18" charset="0"/>
-                                        </a:rPr>
-                                        <m:t>1</m:t>
-                                      </m:r>
-                                    </m:sub>
-                                  </m:sSub>
-                                </m:e>
-                              </m:mr>
-                              <m:mr>
-                                <m:e>
-                                  <m:r>
-                                    <a:rPr lang="en-US" sz="1000" i="1">
-                                      <a:latin typeface="Cambria Math" panose="02040503050406030204" pitchFamily="18" charset="0"/>
-                                    </a:rPr>
-                                    <m:t>⋮</m:t>
-                                  </m:r>
-                                </m:e>
-                              </m:mr>
-                              <m:mr>
-                                <m:e>
-                                  <m:sSub>
-                                    <m:sSubPr>
-                                      <m:ctrlPr>
-                                        <a:rPr lang="en-US" sz="1000" i="1">
-                                          <a:latin typeface="Cambria Math" panose="02040503050406030204" pitchFamily="18" charset="0"/>
-                                        </a:rPr>
-                                      </m:ctrlPr>
-                                    </m:sSubPr>
-                                    <m:e>
-                                      <m:r>
-                                        <a:rPr lang="en-US" sz="1000" i="1">
-                                          <a:latin typeface="Cambria Math" panose="02040503050406030204" pitchFamily="18" charset="0"/>
-                                          <a:ea typeface="Cambria Math" panose="02040503050406030204" pitchFamily="18" charset="0"/>
-                                        </a:rPr>
-                                        <m:t>𝜔</m:t>
-                                      </m:r>
-                                    </m:e>
-                                    <m:sub>
-                                      <m:r>
-                                        <a:rPr lang="en-US" sz="1000" i="1">
-                                          <a:latin typeface="Cambria Math" panose="02040503050406030204" pitchFamily="18" charset="0"/>
-                                          <a:ea typeface="Cambria Math" panose="02040503050406030204" pitchFamily="18" charset="0"/>
-                                        </a:rPr>
-                                        <m:t>𝑁</m:t>
-                                      </m:r>
-                                    </m:sub>
-                                  </m:sSub>
-                                </m:e>
-                              </m:mr>
-                            </m:m>
-                          </m:e>
-                        </m:d>
-                        <m:r>
-                          <a:rPr lang="en-US" sz="1000" b="0" i="1" smtClean="0">
-                            <a:latin typeface="Cambria Math" panose="02040503050406030204" pitchFamily="18" charset="0"/>
-                            <a:ea typeface="Cambria Math" panose="02040503050406030204" pitchFamily="18" charset="0"/>
-                          </a:rPr>
-                          <m:t>,</m:t>
-                        </m:r>
-                        <m:r>
-                          <a:rPr lang="en-US" sz="1000" i="1">
-                            <a:latin typeface="Cambria Math" panose="02040503050406030204" pitchFamily="18" charset="0"/>
-                            <a:ea typeface="Cambria Math" panose="02040503050406030204" pitchFamily="18" charset="0"/>
-                          </a:rPr>
-                          <m:t>𝛾</m:t>
-                        </m:r>
-                        <m:d>
-                          <m:dPr>
-                            <m:ctrlPr>
-                              <a:rPr lang="en-US" sz="1000" i="1">
-                                <a:latin typeface="Cambria Math" panose="02040503050406030204" pitchFamily="18" charset="0"/>
-                              </a:rPr>
-                            </m:ctrlPr>
-                          </m:dPr>
-                          <m:e>
-                            <m:acc>
-                              <m:accPr>
-                                <m:chr m:val="⃗"/>
-                                <m:ctrlPr>
-                                  <a:rPr lang="en-US" sz="1000" i="1">
-                                    <a:latin typeface="Cambria Math" panose="02040503050406030204" pitchFamily="18" charset="0"/>
-                                  </a:rPr>
-                                </m:ctrlPr>
-                              </m:accPr>
-                              <m:e>
-                                <m:r>
-                                  <a:rPr lang="en-US" sz="1000" i="1">
-                                    <a:latin typeface="Cambria Math" panose="02040503050406030204" pitchFamily="18" charset="0"/>
-                                  </a:rPr>
-                                  <m:t>𝑥</m:t>
-                                </m:r>
-                              </m:e>
-                            </m:acc>
-                            <m:r>
-                              <a:rPr lang="en-US" sz="1000" i="1">
-                                <a:latin typeface="Cambria Math" panose="02040503050406030204" pitchFamily="18" charset="0"/>
-                              </a:rPr>
-                              <m:t>,</m:t>
-                            </m:r>
-                            <m:r>
-                              <a:rPr lang="en-US" sz="1000" i="1">
-                                <a:latin typeface="Cambria Math" panose="02040503050406030204" pitchFamily="18" charset="0"/>
-                              </a:rPr>
-                              <m:t>𝑡</m:t>
-                            </m:r>
-                          </m:e>
-                        </m:d>
-                      </m:e>
-                    </m:d>
-                    <m:r>
-                      <a:rPr lang="en-US" sz="1000" b="0" i="1" smtClean="0">
-                        <a:latin typeface="Cambria Math" panose="02040503050406030204" pitchFamily="18" charset="0"/>
-                        <a:ea typeface="Cambria Math" panose="02040503050406030204" pitchFamily="18" charset="0"/>
-                      </a:rPr>
-                      <m:t>=0</m:t>
-                    </m:r>
-                  </m:oMath>
-                </a14:m>
-                <a:endParaRPr lang="en-US" sz="1000" dirty="0"/>
-              </a:p>
-            </p:txBody>
-          </p:sp>
-        </mc:Choice>
-        <mc:Fallback>
-          <p:sp>
-            <p:nvSpPr>
-              <p:cNvPr id="2" name="TextBox 1">
-                <a:extLst>
-                  <a:ext uri="{FF2B5EF4-FFF2-40B4-BE49-F238E27FC236}">
-                    <a16:creationId xmlns:a16="http://schemas.microsoft.com/office/drawing/2014/main" id="{C45F9290-300F-BCA9-D078-0DBE0F52DBCA}"/>
-                  </a:ext>
-                </a:extLst>
-              </p:cNvPr>
-              <p:cNvSpPr txBox="1">
-                <a:spLocks noRot="1" noChangeAspect="1" noMove="1" noResize="1" noEditPoints="1" noAdjustHandles="1" noChangeArrowheads="1" noChangeShapeType="1" noTextEdit="1"/>
-              </p:cNvSpPr>
-              <p:nvPr/>
-            </p:nvSpPr>
-            <p:spPr>
-              <a:xfrm>
-                <a:off x="588613" y="876228"/>
-                <a:ext cx="3725150" cy="587790"/>
-              </a:xfrm>
-              <a:prstGeom prst="rect">
-                <a:avLst/>
-              </a:prstGeom>
-              <a:blipFill>
-                <a:blip r:embed="rId2"/>
-                <a:stretch>
-                  <a:fillRect/>
-                </a:stretch>
-              </a:blipFill>
-              <a:ln>
-                <a:solidFill>
-                  <a:schemeClr val="tx1"/>
-                </a:solidFill>
-              </a:ln>
-            </p:spPr>
-            <p:txBody>
-              <a:bodyPr/>
-              <a:lstStyle/>
-              <a:p>
-                <a:r>
-                  <a:rPr lang="en-US">
-                    <a:noFill/>
-                  </a:rPr>
-                  <a:t> </a:t>
-                </a:r>
-              </a:p>
-            </p:txBody>
-          </p:sp>
-        </mc:Fallback>
-      </mc:AlternateContent>
-      <p:sp>
-        <p:nvSpPr>
-          <p:cNvPr id="4" name="TextBox 3">
-            <a:extLst>
-              <a:ext uri="{FF2B5EF4-FFF2-40B4-BE49-F238E27FC236}">
-                <a16:creationId xmlns:a16="http://schemas.microsoft.com/office/drawing/2014/main" id="{91308CA0-C244-D9E6-8632-71E4594ED275}"/>
-              </a:ext>
-            </a:extLst>
-          </p:cNvPr>
-          <p:cNvSpPr txBox="1"/>
-          <p:nvPr/>
-        </p:nvSpPr>
-        <p:spPr>
-          <a:xfrm>
-            <a:off x="4313763" y="885266"/>
-            <a:ext cx="1743237" cy="584775"/>
-          </a:xfrm>
-          <a:prstGeom prst="rect">
-            <a:avLst/>
-          </a:prstGeom>
-          <a:noFill/>
-        </p:spPr>
-        <p:txBody>
-          <a:bodyPr wrap="square" rtlCol="0">
-            <a:spAutoFit/>
-          </a:bodyPr>
-          <a:lstStyle/>
-          <a:p>
-            <a:r>
-              <a:rPr lang="en-US" sz="3200" dirty="0">
-                <a:latin typeface="Futura Medium" panose="020B0602020204020303" pitchFamily="34" charset="-79"/>
-                <a:cs typeface="Futura Medium" panose="020B0602020204020303" pitchFamily="34" charset="-79"/>
-              </a:rPr>
-              <a:t>PDE-CL</a:t>
-            </a:r>
-          </a:p>
-        </p:txBody>
-      </p:sp>
-    </p:spTree>
-    <p:extLst>
-      <p:ext uri="{BB962C8B-B14F-4D97-AF65-F5344CB8AC3E}">
-        <p14:creationId xmlns:p14="http://schemas.microsoft.com/office/powerpoint/2010/main" val="2150363726"/>
       </p:ext>
     </p:extLst>
   </p:cSld>

</xml_diff>